<commit_message>
Figure mise en place + tables des figures
</commit_message>
<xml_diff>
--- a/Soutenance/Soutenance-modal.pptx
+++ b/Soutenance/Soutenance-modal.pptx
@@ -210,7 +210,7 @@
             <a:fld id="{9ABBB101-BE51-40FE-8130-F6D718202824}" type="datetimeFigureOut">
               <a:rPr lang="fr-FR" smtClean="0"/>
               <a:pPr/>
-              <a:t>21/10/2014</a:t>
+              <a:t>11/06/15</a:t>
             </a:fld>
             <a:endParaRPr lang="fr-FR"/>
           </a:p>
@@ -372,7 +372,7 @@
             <a:fld id="{675FF2AE-FF4A-42B1-9BD3-B51E6D941A76}" type="slidenum">
               <a:rPr lang="fr-FR" smtClean="0"/>
               <a:pPr/>
-              <a:t>‹N°›</a:t>
+              <a:t>‹#›</a:t>
             </a:fld>
             <a:endParaRPr lang="fr-FR"/>
           </a:p>
@@ -381,7 +381,7 @@
     </p:spTree>
     <p:extLst>
       <p:ext uri="{BB962C8B-B14F-4D97-AF65-F5344CB8AC3E}">
-        <p14:creationId xmlns="" xmlns:p14="http://schemas.microsoft.com/office/powerpoint/2010/main" val="2117327923"/>
+        <p14:creationId xmlns:p14="http://schemas.microsoft.com/office/powerpoint/2010/main" val="2117327923"/>
       </p:ext>
     </p:extLst>
   </p:cSld>
@@ -556,7 +556,7 @@
     </p:spTree>
     <p:extLst>
       <p:ext uri="{BB962C8B-B14F-4D97-AF65-F5344CB8AC3E}">
-        <p14:creationId xmlns="" xmlns:p14="http://schemas.microsoft.com/office/powerpoint/2010/main" val="1473299475"/>
+        <p14:creationId xmlns:p14="http://schemas.microsoft.com/office/powerpoint/2010/main" val="1473299475"/>
       </p:ext>
     </p:extLst>
   </p:cSld>
@@ -641,7 +641,7 @@
     </p:spTree>
     <p:extLst>
       <p:ext uri="{BB962C8B-B14F-4D97-AF65-F5344CB8AC3E}">
-        <p14:creationId xmlns="" xmlns:p14="http://schemas.microsoft.com/office/powerpoint/2010/main" val="618816336"/>
+        <p14:creationId xmlns:p14="http://schemas.microsoft.com/office/powerpoint/2010/main" val="618816336"/>
       </p:ext>
     </p:extLst>
   </p:cSld>
@@ -891,7 +891,7 @@
   <p:clrMapOvr>
     <a:masterClrMapping/>
   </p:clrMapOvr>
-  <p:transition>
+  <p:transition xmlns:p14="http://schemas.microsoft.com/office/powerpoint/2010/main">
     <p:fade/>
   </p:transition>
 </p:sldLayout>
@@ -1999,7 +1999,7 @@
   <p:clrMapOvr>
     <a:masterClrMapping/>
   </p:clrMapOvr>
-  <p:transition>
+  <p:transition xmlns:p14="http://schemas.microsoft.com/office/powerpoint/2010/main">
     <p:fade/>
   </p:transition>
 </p:sldLayout>
@@ -2211,7 +2211,7 @@
   <p:clrMapOvr>
     <a:masterClrMapping/>
   </p:clrMapOvr>
-  <p:transition>
+  <p:transition xmlns:p14="http://schemas.microsoft.com/office/powerpoint/2010/main">
     <p:fade/>
   </p:transition>
 </p:sldLayout>
@@ -3320,7 +3320,7 @@
   <p:clrMapOvr>
     <a:masterClrMapping/>
   </p:clrMapOvr>
-  <p:transition>
+  <p:transition xmlns:p14="http://schemas.microsoft.com/office/powerpoint/2010/main">
     <p:fade/>
   </p:transition>
 </p:sldLayout>
@@ -3532,7 +3532,7 @@
   <p:clrMapOvr>
     <a:masterClrMapping/>
   </p:clrMapOvr>
-  <p:transition>
+  <p:transition xmlns:p14="http://schemas.microsoft.com/office/powerpoint/2010/main">
     <p:fade/>
   </p:transition>
 </p:sldLayout>
@@ -4641,7 +4641,7 @@
   <p:clrMapOvr>
     <a:masterClrMapping/>
   </p:clrMapOvr>
-  <p:transition>
+  <p:transition xmlns:p14="http://schemas.microsoft.com/office/powerpoint/2010/main">
     <p:fade/>
   </p:transition>
 </p:sldLayout>
@@ -4853,7 +4853,7 @@
   <p:clrMapOvr>
     <a:masterClrMapping/>
   </p:clrMapOvr>
-  <p:transition>
+  <p:transition xmlns:p14="http://schemas.microsoft.com/office/powerpoint/2010/main">
     <p:fade/>
   </p:transition>
 </p:sldLayout>
@@ -5961,7 +5961,7 @@
   <p:clrMapOvr>
     <a:masterClrMapping/>
   </p:clrMapOvr>
-  <p:transition>
+  <p:transition xmlns:p14="http://schemas.microsoft.com/office/powerpoint/2010/main">
     <p:fade/>
   </p:transition>
 </p:sldLayout>
@@ -6173,7 +6173,7 @@
   <p:clrMapOvr>
     <a:masterClrMapping/>
   </p:clrMapOvr>
-  <p:transition>
+  <p:transition xmlns:p14="http://schemas.microsoft.com/office/powerpoint/2010/main">
     <p:fade/>
   </p:transition>
 </p:sldLayout>
@@ -6237,7 +6237,7 @@
             <a:fld id="{646E7B68-C406-4B5C-B79D-A1CDE10CB85D}" type="slidenum">
               <a:rPr lang="fr-FR" smtClean="0"/>
               <a:pPr/>
-              <a:t>‹N°›</a:t>
+              <a:t>‹#›</a:t>
             </a:fld>
             <a:endParaRPr lang="fr-FR"/>
           </a:p>
@@ -6308,7 +6308,7 @@
   <p:clrMapOvr>
     <a:masterClrMapping/>
   </p:clrMapOvr>
-  <p:transition>
+  <p:transition xmlns:p14="http://schemas.microsoft.com/office/powerpoint/2010/main">
     <p:fade/>
   </p:transition>
 </p:sldLayout>
@@ -6372,7 +6372,7 @@
             <a:fld id="{646E7B68-C406-4B5C-B79D-A1CDE10CB85D}" type="slidenum">
               <a:rPr lang="fr-FR" smtClean="0"/>
               <a:pPr/>
-              <a:t>‹N°›</a:t>
+              <a:t>‹#›</a:t>
             </a:fld>
             <a:endParaRPr lang="fr-FR"/>
           </a:p>
@@ -6552,7 +6552,7 @@
   <p:clrMapOvr>
     <a:masterClrMapping/>
   </p:clrMapOvr>
-  <p:transition>
+  <p:transition xmlns:p14="http://schemas.microsoft.com/office/powerpoint/2010/main">
     <p:fade/>
   </p:transition>
 </p:sldLayout>
@@ -7661,7 +7661,7 @@
   <p:clrMapOvr>
     <a:masterClrMapping/>
   </p:clrMapOvr>
-  <p:transition>
+  <p:transition xmlns:p14="http://schemas.microsoft.com/office/powerpoint/2010/main">
     <p:fade/>
   </p:transition>
 </p:sldLayout>
@@ -7725,7 +7725,7 @@
             <a:fld id="{646E7B68-C406-4B5C-B79D-A1CDE10CB85D}" type="slidenum">
               <a:rPr lang="fr-FR" smtClean="0"/>
               <a:pPr/>
-              <a:t>‹N°›</a:t>
+              <a:t>‹#›</a:t>
             </a:fld>
             <a:endParaRPr lang="fr-FR"/>
           </a:p>
@@ -7978,13 +7978,13 @@
   <p:clrMapOvr>
     <a:masterClrMapping/>
   </p:clrMapOvr>
-  <p:transition>
+  <p:transition xmlns:p14="http://schemas.microsoft.com/office/powerpoint/2010/main">
     <p:fade/>
   </p:transition>
   <p:timing>
     <p:tnLst>
       <p:par>
-        <p:cTn id="1" dur="indefinite" restart="never" nodeType="tmRoot"/>
+        <p:cTn xmlns:p14="http://schemas.microsoft.com/office/powerpoint/2010/main" id="1" dur="indefinite" restart="never" nodeType="tmRoot"/>
       </p:par>
     </p:tnLst>
   </p:timing>
@@ -8197,7 +8197,7 @@
   <p:clrMapOvr>
     <a:masterClrMapping/>
   </p:clrMapOvr>
-  <p:transition>
+  <p:transition xmlns:p14="http://schemas.microsoft.com/office/powerpoint/2010/main">
     <p:fade/>
   </p:transition>
 </p:sldLayout>
@@ -9305,7 +9305,7 @@
   <p:clrMapOvr>
     <a:masterClrMapping/>
   </p:clrMapOvr>
-  <p:transition>
+  <p:transition xmlns:p14="http://schemas.microsoft.com/office/powerpoint/2010/main">
     <p:fade/>
   </p:transition>
 </p:sldLayout>
@@ -9517,7 +9517,7 @@
   <p:clrMapOvr>
     <a:masterClrMapping/>
   </p:clrMapOvr>
-  <p:transition>
+  <p:transition xmlns:p14="http://schemas.microsoft.com/office/powerpoint/2010/main">
     <p:fade/>
   </p:transition>
 </p:sldLayout>
@@ -10626,7 +10626,7 @@
   <p:clrMapOvr>
     <a:masterClrMapping/>
   </p:clrMapOvr>
-  <p:transition>
+  <p:transition xmlns:p14="http://schemas.microsoft.com/office/powerpoint/2010/main">
     <p:fade/>
   </p:transition>
 </p:sldLayout>
@@ -10831,7 +10831,7 @@
   <p:clrMapOvr>
     <a:masterClrMapping/>
   </p:clrMapOvr>
-  <p:transition>
+  <p:transition xmlns:p14="http://schemas.microsoft.com/office/powerpoint/2010/main">
     <p:fade/>
   </p:transition>
 </p:sldLayout>
@@ -11940,7 +11940,7 @@
   <p:clrMapOvr>
     <a:masterClrMapping/>
   </p:clrMapOvr>
-  <p:transition>
+  <p:transition xmlns:p14="http://schemas.microsoft.com/office/powerpoint/2010/main">
     <p:fade/>
   </p:transition>
 </p:sldLayout>
@@ -12152,7 +12152,7 @@
   <p:clrMapOvr>
     <a:masterClrMapping/>
   </p:clrMapOvr>
-  <p:transition>
+  <p:transition xmlns:p14="http://schemas.microsoft.com/office/powerpoint/2010/main">
     <p:fade/>
   </p:transition>
 </p:sldLayout>
@@ -12297,7 +12297,7 @@
             <a:fld id="{646E7B68-C406-4B5C-B79D-A1CDE10CB85D}" type="slidenum">
               <a:rPr lang="fr-FR" smtClean="0"/>
               <a:pPr/>
-              <a:t>‹N°›</a:t>
+              <a:t>‹#›</a:t>
             </a:fld>
             <a:endParaRPr lang="fr-FR" dirty="0"/>
           </a:p>
@@ -12433,7 +12433,7 @@
     <p:sldLayoutId id="2147483666" r:id="rId19"/>
     <p:sldLayoutId id="2147483667" r:id="rId20"/>
   </p:sldLayoutIdLst>
-  <p:transition>
+  <p:transition xmlns:p14="http://schemas.microsoft.com/office/powerpoint/2010/main">
     <p:fade/>
   </p:transition>
   <p:hf hdr="0" dt="0"/>
@@ -12737,14 +12737,19 @@
             <p:ph type="ctrTitle"/>
           </p:nvPr>
         </p:nvSpPr>
-        <p:spPr/>
+        <p:spPr>
+          <a:xfrm>
+            <a:off x="4211960" y="1995686"/>
+            <a:ext cx="4608190" cy="562674"/>
+          </a:xfrm>
+        </p:spPr>
         <p:txBody>
           <a:bodyPr/>
           <a:lstStyle/>
           <a:p>
             <a:r>
               <a:rPr lang="fr-FR" dirty="0" smtClean="0"/>
-              <a:t>Pré soutenance PSC</a:t>
+              <a:t>Soutenance modal Robot</a:t>
             </a:r>
             <a:endParaRPr lang="fr-FR" dirty="0"/>
           </a:p>
@@ -12762,38 +12767,24 @@
         </p:nvSpPr>
         <p:spPr>
           <a:xfrm>
-            <a:off x="4787900" y="2715172"/>
-            <a:ext cx="4032249" cy="792682"/>
+            <a:off x="4211960" y="2715172"/>
+            <a:ext cx="4608189" cy="576658"/>
           </a:xfrm>
         </p:spPr>
         <p:txBody>
           <a:bodyPr/>
           <a:lstStyle/>
           <a:p>
-            <a:r>
-              <a:rPr lang="fr-FR" dirty="0" smtClean="0"/>
-              <a:t>Groupe PHY 01</a:t>
-            </a:r>
-          </a:p>
-          <a:p>
             <a:endParaRPr lang="fr-FR" dirty="0" smtClean="0"/>
           </a:p>
           <a:p>
             <a:r>
               <a:rPr lang="fr-FR" dirty="0" smtClean="0"/>
-              <a:t>International </a:t>
-            </a:r>
-            <a:r>
-              <a:rPr lang="fr-FR" dirty="0" err="1" smtClean="0"/>
-              <a:t>Phycisists</a:t>
-            </a:r>
-            <a:r>
-              <a:rPr lang="fr-FR" dirty="0" smtClean="0"/>
-              <a:t>’ </a:t>
-            </a:r>
-            <a:r>
-              <a:rPr lang="fr-FR" dirty="0" err="1" smtClean="0"/>
-              <a:t>Tournament</a:t>
+              <a:t>Comment faire suivre les murs </a:t>
+            </a:r>
+            <a:r>
+              <a:rPr lang="fr-FR" dirty="0" smtClean="0"/>
+              <a:t>à un drone?</a:t>
             </a:r>
             <a:endParaRPr lang="fr-FR" dirty="0" smtClean="0"/>
           </a:p>
@@ -12812,8 +12803,8 @@
         </p:nvSpPr>
         <p:spPr>
           <a:xfrm>
-            <a:off x="6804248" y="3795886"/>
-            <a:ext cx="2016125" cy="1224136"/>
+            <a:off x="6804248" y="4587974"/>
+            <a:ext cx="2016125" cy="432048"/>
           </a:xfrm>
           <a:prstGeom prst="rect">
             <a:avLst/>
@@ -12999,40 +12990,14 @@
           <a:p>
             <a:r>
               <a:rPr lang="fr-FR" sz="1100" dirty="0" smtClean="0"/>
-              <a:t>BENZAOUIA Mohammed</a:t>
+              <a:t>Basile BRUNEAU</a:t>
             </a:r>
           </a:p>
           <a:p>
             <a:r>
               <a:rPr lang="fr-FR" sz="1100" dirty="0" smtClean="0"/>
-              <a:t>BRUNAUD Vincent</a:t>
-            </a:r>
-          </a:p>
-          <a:p>
-            <a:r>
-              <a:rPr lang="fr-FR" sz="1100" dirty="0" smtClean="0"/>
-              <a:t>MERIGOUX Denis</a:t>
-            </a:r>
-          </a:p>
-          <a:p>
-            <a:r>
-              <a:rPr lang="fr-FR" sz="1100" dirty="0" smtClean="0"/>
-              <a:t>MIQUEL Thomas</a:t>
-            </a:r>
-          </a:p>
-          <a:p>
-            <a:r>
-              <a:rPr lang="fr-FR" sz="1100" dirty="0" smtClean="0"/>
-              <a:t>ROUSSEAU Pierre</a:t>
-            </a:r>
-          </a:p>
-          <a:p>
-            <a:r>
-              <a:rPr lang="fr-FR" sz="1100" dirty="0" smtClean="0"/>
-              <a:t>TUEKAM FOTOO Guy Francis</a:t>
-            </a:r>
-          </a:p>
-          <a:p>
+              <a:t>Youssef ACHARI BERRADA</a:t>
+            </a:r>
             <a:endParaRPr lang="fr-FR" sz="1100" dirty="0" smtClean="0"/>
           </a:p>
         </p:txBody>
@@ -13042,13 +13007,13 @@
   <p:clrMapOvr>
     <a:masterClrMapping/>
   </p:clrMapOvr>
-  <p:transition>
+  <p:transition xmlns:p14="http://schemas.microsoft.com/office/powerpoint/2010/main">
     <p:fade/>
   </p:transition>
   <p:timing>
     <p:tnLst>
       <p:par>
-        <p:cTn id="1" dur="indefinite" restart="never" nodeType="tmRoot"/>
+        <p:cTn xmlns:p14="http://schemas.microsoft.com/office/powerpoint/2010/main" id="1" dur="indefinite" restart="never" nodeType="tmRoot"/>
       </p:par>
     </p:tnLst>
   </p:timing>
@@ -13170,23 +13135,7 @@
                   <a:schemeClr val="tx2"/>
                 </a:solidFill>
               </a:rPr>
-              <a:t>Réunion plénière du groupe pour répartir les </a:t>
-            </a:r>
-            <a:r>
-              <a:rPr lang="fr-FR" dirty="0" smtClean="0">
-                <a:solidFill>
-                  <a:schemeClr val="tx2"/>
-                </a:solidFill>
-              </a:rPr>
-              <a:t>9 </a:t>
-            </a:r>
-            <a:r>
-              <a:rPr lang="fr-FR" dirty="0" smtClean="0">
-                <a:solidFill>
-                  <a:schemeClr val="tx2"/>
-                </a:solidFill>
-              </a:rPr>
-              <a:t>problèmes restants avant les vacances de Noël.</a:t>
+              <a:t>Réunion plénière du groupe pour répartir les 9 problèmes restants avant les vacances de Noël.</a:t>
             </a:r>
           </a:p>
           <a:p>
@@ -13324,15 +13273,7 @@
             </a:pPr>
             <a:r>
               <a:rPr lang="fr-FR" u="sng" dirty="0" smtClean="0"/>
-              <a:t>É</a:t>
-            </a:r>
-            <a:r>
-              <a:rPr lang="fr-FR" u="sng" dirty="0" smtClean="0"/>
-              <a:t>chec </a:t>
-            </a:r>
-            <a:r>
-              <a:rPr lang="fr-FR" u="sng" dirty="0" smtClean="0"/>
-              <a:t>:</a:t>
+              <a:t>Échec :</a:t>
             </a:r>
             <a:endParaRPr lang="fr-FR" dirty="0" smtClean="0"/>
           </a:p>
@@ -13493,20 +13434,20 @@
     </p:spTree>
     <p:extLst>
       <p:ext uri="{BB962C8B-B14F-4D97-AF65-F5344CB8AC3E}">
-        <p14:creationId xmlns="" xmlns:p14="http://schemas.microsoft.com/office/powerpoint/2010/main" val="24917039"/>
+        <p14:creationId xmlns:p14="http://schemas.microsoft.com/office/powerpoint/2010/main" val="24917039"/>
       </p:ext>
     </p:extLst>
   </p:cSld>
   <p:clrMapOvr>
     <a:masterClrMapping/>
   </p:clrMapOvr>
-  <p:transition>
+  <p:transition xmlns:p14="http://schemas.microsoft.com/office/powerpoint/2010/main">
     <p:fade/>
   </p:transition>
   <p:timing>
     <p:tnLst>
       <p:par>
-        <p:cTn id="1" dur="indefinite" restart="never" nodeType="tmRoot"/>
+        <p:cTn xmlns:p14="http://schemas.microsoft.com/office/powerpoint/2010/main" id="1" dur="indefinite" restart="never" nodeType="tmRoot"/>
       </p:par>
     </p:tnLst>
   </p:timing>
@@ -13595,13 +13536,13 @@
   <p:clrMapOvr>
     <a:masterClrMapping/>
   </p:clrMapOvr>
-  <p:transition>
+  <p:transition xmlns:p14="http://schemas.microsoft.com/office/powerpoint/2010/main">
     <p:fade/>
   </p:transition>
   <p:timing>
     <p:tnLst>
       <p:par>
-        <p:cTn id="1" dur="indefinite" restart="never" nodeType="tmRoot"/>
+        <p:cTn xmlns:p14="http://schemas.microsoft.com/office/powerpoint/2010/main" id="1" dur="indefinite" restart="never" nodeType="tmRoot"/>
       </p:par>
     </p:tnLst>
   </p:timing>
@@ -13680,11 +13621,16 @@
             <a:picLocks noRot="1" noChangeAspect="1"/>
           </p:cNvPicPr>
           <p:nvPr>
-            <a:videoFile r:link="rId1"/>
+            <a:videoFile r:link="rId2"/>
+            <p:extLst>
+              <p:ext uri="{DAA4B4D4-6D71-4841-9C94-3DE7FCFB9230}">
+                <p14:media xmlns:p14="http://schemas.microsoft.com/office/powerpoint/2010/main" r:link="rId1"/>
+              </p:ext>
+            </p:extLst>
           </p:nvPr>
         </p:nvPicPr>
         <p:blipFill>
-          <a:blip r:embed="rId3" cstate="print"/>
+          <a:blip r:embed="rId4" cstate="print"/>
           <a:stretch>
             <a:fillRect/>
           </a:stretch>
@@ -13827,13 +13773,13 @@
   <p:clrMapOvr>
     <a:masterClrMapping/>
   </p:clrMapOvr>
-  <p:transition>
+  <p:transition xmlns:p14="http://schemas.microsoft.com/office/powerpoint/2010/main">
     <p:fade/>
   </p:transition>
   <p:timing>
     <p:tnLst>
       <p:par>
-        <p:cTn id="1" dur="indefinite" restart="never" nodeType="tmRoot">
+        <p:cTn xmlns:p14="http://schemas.microsoft.com/office/powerpoint/2010/main" id="1" dur="indefinite" restart="never" nodeType="tmRoot">
           <p:childTnLst>
             <p:seq concurrent="1" nextAc="seek">
               <p:cTn id="2" dur="indefinite" nodeType="mainSeq">
@@ -14017,11 +13963,7 @@
           <a:p>
             <a:r>
               <a:rPr lang="fr-FR" dirty="0" smtClean="0"/>
-              <a:t>1- Canon </a:t>
-            </a:r>
-            <a:r>
-              <a:rPr lang="fr-FR" dirty="0" smtClean="0"/>
-              <a:t>à vortex</a:t>
+              <a:t>1- Canon à vortex</a:t>
             </a:r>
             <a:endParaRPr lang="fr-FR" dirty="0"/>
           </a:p>
@@ -14448,13 +14390,13 @@
   <p:clrMapOvr>
     <a:masterClrMapping/>
   </p:clrMapOvr>
-  <p:transition>
+  <p:transition xmlns:p14="http://schemas.microsoft.com/office/powerpoint/2010/main">
     <p:fade/>
   </p:transition>
   <p:timing>
     <p:tnLst>
       <p:par>
-        <p:cTn id="1" dur="indefinite" restart="never" nodeType="tmRoot"/>
+        <p:cTn xmlns:p14="http://schemas.microsoft.com/office/powerpoint/2010/main" id="1" dur="indefinite" restart="never" nodeType="tmRoot"/>
       </p:par>
     </p:tnLst>
   </p:timing>
@@ -14628,13 +14570,8 @@
             </a:pPr>
             <a:r>
               <a:rPr lang="fr-FR" dirty="0" smtClean="0"/>
-              <a:t>Chercheurs du </a:t>
-            </a:r>
-            <a:r>
-              <a:rPr lang="fr-FR" dirty="0" smtClean="0"/>
-              <a:t>LADHYX</a:t>
-            </a:r>
-            <a:endParaRPr lang="fr-FR" dirty="0" smtClean="0"/>
+              <a:t>Chercheurs du LADHYX</a:t>
+            </a:r>
           </a:p>
           <a:p>
             <a:pPr lvl="1"/>
@@ -14702,11 +14639,7 @@
             </a:pPr>
             <a:r>
               <a:rPr lang="fr-FR" dirty="0" smtClean="0"/>
-              <a:t> Caméra </a:t>
-            </a:r>
-            <a:r>
-              <a:rPr lang="fr-FR" dirty="0" smtClean="0"/>
-              <a:t>rapide </a:t>
+              <a:t> Caméra rapide </a:t>
             </a:r>
           </a:p>
           <a:p>
@@ -14976,13 +14909,13 @@
   <p:clrMapOvr>
     <a:masterClrMapping/>
   </p:clrMapOvr>
-  <p:transition>
+  <p:transition xmlns:p14="http://schemas.microsoft.com/office/powerpoint/2010/main">
     <p:fade/>
   </p:transition>
   <p:timing>
     <p:tnLst>
       <p:par>
-        <p:cTn id="1" dur="indefinite" restart="never" nodeType="tmRoot"/>
+        <p:cTn xmlns:p14="http://schemas.microsoft.com/office/powerpoint/2010/main" id="1" dur="indefinite" restart="never" nodeType="tmRoot"/>
       </p:par>
     </p:tnLst>
   </p:timing>
@@ -15187,11 +15120,16 @@
             <a:picLocks noRot="1" noChangeAspect="1"/>
           </p:cNvPicPr>
           <p:nvPr>
-            <a:videoFile r:link="rId1"/>
+            <a:videoFile r:link="rId2"/>
+            <p:extLst>
+              <p:ext uri="{DAA4B4D4-6D71-4841-9C94-3DE7FCFB9230}">
+                <p14:media xmlns:p14="http://schemas.microsoft.com/office/powerpoint/2010/main" r:link="rId1"/>
+              </p:ext>
+            </p:extLst>
           </p:nvPr>
         </p:nvPicPr>
         <p:blipFill>
-          <a:blip r:embed="rId3" cstate="print"/>
+          <a:blip r:embed="rId4" cstate="print"/>
           <a:stretch>
             <a:fillRect/>
           </a:stretch>
@@ -15211,13 +15149,13 @@
   <p:clrMapOvr>
     <a:masterClrMapping/>
   </p:clrMapOvr>
-  <p:transition>
+  <p:transition xmlns:p14="http://schemas.microsoft.com/office/powerpoint/2010/main">
     <p:fade/>
   </p:transition>
   <p:timing>
     <p:tnLst>
       <p:par>
-        <p:cTn id="1" dur="indefinite" restart="never" nodeType="tmRoot">
+        <p:cTn xmlns:p14="http://schemas.microsoft.com/office/powerpoint/2010/main" id="1" dur="indefinite" restart="never" nodeType="tmRoot">
           <p:childTnLst>
             <p:seq concurrent="1" nextAc="seek">
               <p:cTn id="2" restart="whenNotActive" fill="hold" evtFilter="cancelBubble" nodeType="interactiveSeq">
@@ -15418,15 +15356,7 @@
           <a:p>
             <a:r>
               <a:rPr lang="fr-FR" dirty="0" smtClean="0"/>
-              <a:t>É</a:t>
-            </a:r>
-            <a:r>
-              <a:rPr lang="fr-FR" dirty="0" smtClean="0"/>
-              <a:t>noncé </a:t>
-            </a:r>
-            <a:r>
-              <a:rPr lang="fr-FR" dirty="0" smtClean="0"/>
-              <a:t>du problème:</a:t>
+              <a:t>Énoncé du problème:</a:t>
             </a:r>
           </a:p>
           <a:p>
@@ -15920,13 +15850,13 @@
   <p:clrMapOvr>
     <a:masterClrMapping/>
   </p:clrMapOvr>
-  <p:transition>
+  <p:transition xmlns:p14="http://schemas.microsoft.com/office/powerpoint/2010/main">
     <p:fade/>
   </p:transition>
   <p:timing>
     <p:tnLst>
       <p:par>
-        <p:cTn id="1" dur="indefinite" restart="never" nodeType="tmRoot"/>
+        <p:cTn xmlns:p14="http://schemas.microsoft.com/office/powerpoint/2010/main" id="1" dur="indefinite" restart="never" nodeType="tmRoot"/>
       </p:par>
     </p:tnLst>
   </p:timing>
@@ -16106,13 +16036,8 @@
             </a:pPr>
             <a:r>
               <a:rPr lang="fr-FR" dirty="0" smtClean="0"/>
-              <a:t>Chercheurs du </a:t>
-            </a:r>
-            <a:r>
-              <a:rPr lang="fr-FR" dirty="0" smtClean="0"/>
-              <a:t>LADHYX </a:t>
-            </a:r>
-            <a:endParaRPr lang="fr-FR" dirty="0" smtClean="0"/>
+              <a:t>Chercheurs du LADHYX </a:t>
+            </a:r>
           </a:p>
           <a:p>
             <a:pPr lvl="1"/>
@@ -16198,7 +16123,6 @@
               <a:rPr lang="fr-FR" dirty="0" smtClean="0"/>
               <a:t> Bière </a:t>
             </a:r>
-            <a:endParaRPr lang="fr-FR" dirty="0" smtClean="0"/>
           </a:p>
           <a:p>
             <a:endParaRPr lang="fr-FR" dirty="0"/>
@@ -16302,14 +16226,6 @@
               </a:rPr>
               <a:t>Deux exemples de problèmes</a:t>
             </a:r>
-            <a:endParaRPr lang="fr-FR" sz="750" b="1" kern="1200" cap="all" dirty="0" smtClean="0">
-              <a:solidFill>
-                <a:srgbClr val="87788B"/>
-              </a:solidFill>
-              <a:latin typeface="+mj-lt"/>
-              <a:ea typeface="+mn-ea"/>
-              <a:cs typeface="+mn-cs"/>
-            </a:endParaRPr>
           </a:p>
         </p:txBody>
       </p:sp>
@@ -16469,13 +16385,13 @@
   <p:clrMapOvr>
     <a:masterClrMapping/>
   </p:clrMapOvr>
-  <p:transition>
+  <p:transition xmlns:p14="http://schemas.microsoft.com/office/powerpoint/2010/main">
     <p:fade/>
   </p:transition>
   <p:timing>
     <p:tnLst>
       <p:par>
-        <p:cTn id="1" dur="indefinite" restart="never" nodeType="tmRoot"/>
+        <p:cTn xmlns:p14="http://schemas.microsoft.com/office/powerpoint/2010/main" id="1" dur="indefinite" restart="never" nodeType="tmRoot"/>
       </p:par>
     </p:tnLst>
   </p:timing>
@@ -16628,15 +16544,7 @@
             <a:pPr lvl="1"/>
             <a:r>
               <a:rPr lang="fr-FR" dirty="0" smtClean="0"/>
-              <a:t>É</a:t>
-            </a:r>
-            <a:r>
-              <a:rPr lang="fr-FR" dirty="0" smtClean="0"/>
-              <a:t>tude </a:t>
-            </a:r>
-            <a:r>
-              <a:rPr lang="fr-FR" dirty="0" smtClean="0"/>
-              <a:t>des neuf problèmes supplémentaires avec les mêmes méthodes.</a:t>
+              <a:t>Étude des neuf problèmes supplémentaires avec les mêmes méthodes.</a:t>
             </a:r>
             <a:endParaRPr lang="fr-FR" dirty="0"/>
           </a:p>
@@ -16796,13 +16704,13 @@
   <p:clrMapOvr>
     <a:masterClrMapping/>
   </p:clrMapOvr>
-  <p:transition>
+  <p:transition xmlns:p14="http://schemas.microsoft.com/office/powerpoint/2010/main">
     <p:fade/>
   </p:transition>
   <p:timing>
     <p:tnLst>
       <p:par>
-        <p:cTn id="1" dur="indefinite" restart="never" nodeType="tmRoot"/>
+        <p:cTn xmlns:p14="http://schemas.microsoft.com/office/powerpoint/2010/main" id="1" dur="indefinite" restart="never" nodeType="tmRoot"/>
       </p:par>
     </p:tnLst>
   </p:timing>
@@ -16896,8 +16804,17 @@
           <a:p>
             <a:r>
               <a:rPr lang="fr-FR" dirty="0" smtClean="0"/>
-              <a:t>I – Le tournoi</a:t>
-            </a:r>
+              <a:t>I – </a:t>
+            </a:r>
+            <a:r>
+              <a:rPr lang="fr-FR" dirty="0" smtClean="0"/>
+              <a:t>Pr</a:t>
+            </a:r>
+            <a:r>
+              <a:rPr lang="fr-FR" dirty="0" smtClean="0"/>
+              <a:t>ésentation du projet</a:t>
+            </a:r>
+            <a:endParaRPr lang="fr-FR" dirty="0" smtClean="0"/>
           </a:p>
           <a:p>
             <a:pPr marL="171450" lvl="1" indent="-171450">
@@ -16906,8 +16823,13 @@
             </a:pPr>
             <a:r>
               <a:rPr lang="fr-FR" dirty="0" smtClean="0"/>
-              <a:t>Présentation du tournoi</a:t>
-            </a:r>
+              <a:t>Id</a:t>
+            </a:r>
+            <a:r>
+              <a:rPr lang="fr-FR" dirty="0" smtClean="0"/>
+              <a:t>ée</a:t>
+            </a:r>
+            <a:endParaRPr lang="fr-FR" dirty="0" smtClean="0"/>
           </a:p>
           <a:p>
             <a:pPr marL="171450" lvl="1" indent="-171450">
@@ -16944,8 +16866,13 @@
             </a:r>
             <a:r>
               <a:rPr lang="fr-FR" dirty="0" smtClean="0"/>
-              <a:t>L’organisation de l’équipe</a:t>
-            </a:r>
+              <a:t>Manipulation du drone avec ROS et </a:t>
+            </a:r>
+            <a:r>
+              <a:rPr lang="fr-FR" dirty="0" err="1" smtClean="0"/>
+              <a:t>OpenCv</a:t>
+            </a:r>
+            <a:endParaRPr lang="fr-FR" dirty="0" smtClean="0"/>
           </a:p>
           <a:p>
             <a:pPr marL="171450" lvl="1" indent="-171450">
@@ -17094,20 +17021,16 @@
           <a:lstStyle/>
           <a:p>
             <a:r>
-              <a:rPr lang="fr-FR" dirty="0"/>
-              <a:t>international </a:t>
-            </a:r>
-            <a:r>
-              <a:rPr lang="fr-FR" dirty="0" err="1"/>
-              <a:t>physicists</a:t>
-            </a:r>
-            <a:r>
-              <a:rPr lang="fr-FR" dirty="0"/>
-              <a:t>’ </a:t>
-            </a:r>
-            <a:r>
-              <a:rPr lang="fr-FR" dirty="0" err="1"/>
-              <a:t>tournament</a:t>
+              <a:rPr lang="en-US" dirty="0" smtClean="0"/>
+              <a:t>M</a:t>
+            </a:r>
+            <a:r>
+              <a:rPr lang="fr-FR" dirty="0" err="1" smtClean="0"/>
+              <a:t>odal</a:t>
+            </a:r>
+            <a:r>
+              <a:rPr lang="fr-FR" dirty="0" smtClean="0"/>
+              <a:t> robot</a:t>
             </a:r>
             <a:endParaRPr lang="fr-FR" dirty="0"/>
           </a:p>
@@ -17142,13 +17065,13 @@
   <p:clrMapOvr>
     <a:masterClrMapping/>
   </p:clrMapOvr>
-  <p:transition>
+  <p:transition xmlns:p14="http://schemas.microsoft.com/office/powerpoint/2010/main">
     <p:fade/>
   </p:transition>
   <p:timing>
     <p:tnLst>
       <p:par>
-        <p:cTn id="1" dur="indefinite" restart="never" nodeType="tmRoot"/>
+        <p:cTn xmlns:p14="http://schemas.microsoft.com/office/powerpoint/2010/main" id="1" dur="indefinite" restart="never" nodeType="tmRoot"/>
       </p:par>
     </p:tnLst>
   </p:timing>
@@ -17212,13 +17135,13 @@
   <p:clrMapOvr>
     <a:masterClrMapping/>
   </p:clrMapOvr>
-  <p:transition>
+  <p:transition xmlns:p14="http://schemas.microsoft.com/office/powerpoint/2010/main">
     <p:fade/>
   </p:transition>
   <p:timing>
     <p:tnLst>
       <p:par>
-        <p:cTn id="1" dur="indefinite" restart="never" nodeType="tmRoot"/>
+        <p:cTn xmlns:p14="http://schemas.microsoft.com/office/powerpoint/2010/main" id="1" dur="indefinite" restart="never" nodeType="tmRoot"/>
       </p:par>
     </p:tnLst>
   </p:timing>
@@ -17338,7 +17261,6 @@
               <a:rPr lang="fr-FR" dirty="0" smtClean="0"/>
               <a:t> en Anglais.</a:t>
             </a:r>
-            <a:endParaRPr lang="fr-FR" dirty="0" smtClean="0"/>
           </a:p>
           <a:p>
             <a:pPr lvl="1"/>
@@ -17627,13 +17549,13 @@
   <p:clrMapOvr>
     <a:masterClrMapping/>
   </p:clrMapOvr>
-  <p:transition>
+  <p:transition xmlns:p14="http://schemas.microsoft.com/office/powerpoint/2010/main">
     <p:fade/>
   </p:transition>
   <p:timing>
     <p:tnLst>
       <p:par>
-        <p:cTn id="1" dur="indefinite" restart="never" nodeType="tmRoot"/>
+        <p:cTn xmlns:p14="http://schemas.microsoft.com/office/powerpoint/2010/main" id="1" dur="indefinite" restart="never" nodeType="tmRoot"/>
       </p:par>
     </p:tnLst>
   </p:timing>
@@ -17760,15 +17682,7 @@
             <a:pPr lvl="1"/>
             <a:r>
               <a:rPr lang="fr-FR" dirty="0" smtClean="0"/>
-              <a:t>L’École </a:t>
-            </a:r>
-            <a:r>
-              <a:rPr lang="fr-FR" dirty="0" smtClean="0"/>
-              <a:t>polytechnique </a:t>
-            </a:r>
-            <a:r>
-              <a:rPr lang="fr-FR" dirty="0" smtClean="0"/>
-              <a:t>participe au tournoi depuis 2013, terminant 3</a:t>
+              <a:t>L’École polytechnique participe au tournoi depuis 2013, terminant 3</a:t>
             </a:r>
             <a:r>
               <a:rPr lang="fr-FR" baseline="30000" dirty="0" smtClean="0"/>
@@ -17801,31 +17715,7 @@
             <a:pPr lvl="1"/>
             <a:r>
               <a:rPr lang="fr-FR" dirty="0" smtClean="0"/>
-              <a:t>Cette année (2015) le tournoi aura lieu à Varsovie entre du </a:t>
-            </a:r>
-            <a:r>
-              <a:rPr lang="fr-FR" dirty="0" smtClean="0"/>
-              <a:t>06</a:t>
-            </a:r>
-            <a:r>
-              <a:rPr lang="fr-FR" dirty="0" smtClean="0"/>
-              <a:t> </a:t>
-            </a:r>
-            <a:r>
-              <a:rPr lang="fr-FR" dirty="0" smtClean="0"/>
-              <a:t>au </a:t>
-            </a:r>
-            <a:r>
-              <a:rPr lang="fr-FR" dirty="0" smtClean="0"/>
-              <a:t>11</a:t>
-            </a:r>
-            <a:r>
-              <a:rPr lang="fr-FR" dirty="0" smtClean="0"/>
-              <a:t> </a:t>
-            </a:r>
-            <a:r>
-              <a:rPr lang="fr-FR" dirty="0" smtClean="0"/>
-              <a:t>avril 2015.</a:t>
+              <a:t>Cette année (2015) le tournoi aura lieu à Varsovie entre du 06 au 11 avril 2015.</a:t>
             </a:r>
           </a:p>
           <a:p>
@@ -18081,13 +17971,13 @@
   <p:clrMapOvr>
     <a:masterClrMapping/>
   </p:clrMapOvr>
-  <p:transition>
+  <p:transition xmlns:p14="http://schemas.microsoft.com/office/powerpoint/2010/main">
     <p:fade/>
   </p:transition>
   <p:timing>
     <p:tnLst>
       <p:par>
-        <p:cTn id="1" dur="indefinite" restart="never" nodeType="tmRoot"/>
+        <p:cTn xmlns:p14="http://schemas.microsoft.com/office/powerpoint/2010/main" id="1" dur="indefinite" restart="never" nodeType="tmRoot"/>
       </p:par>
     </p:tnLst>
   </p:timing>
@@ -18196,31 +18086,7 @@
             <a:pPr lvl="1"/>
             <a:r>
               <a:rPr lang="fr-FR" dirty="0" smtClean="0"/>
-              <a:t>    - Des équipes participantes </a:t>
-            </a:r>
-            <a:r>
-              <a:rPr lang="fr-FR" dirty="0" smtClean="0"/>
-              <a:t>telles que l’ENS </a:t>
-            </a:r>
-            <a:r>
-              <a:rPr lang="fr-FR" dirty="0" smtClean="0"/>
-              <a:t>Ulm, </a:t>
-            </a:r>
-            <a:r>
-              <a:rPr lang="fr-FR" dirty="0" smtClean="0"/>
-              <a:t>l’ESPCI</a:t>
-            </a:r>
-            <a:r>
-              <a:rPr lang="fr-FR" dirty="0" smtClean="0"/>
-              <a:t>, </a:t>
-            </a:r>
-            <a:r>
-              <a:rPr lang="fr-FR" dirty="0" smtClean="0"/>
-              <a:t>l’UPMC</a:t>
-            </a:r>
-            <a:r>
-              <a:rPr lang="fr-FR" dirty="0" smtClean="0"/>
-              <a:t>.</a:t>
+              <a:t>    - Des équipes participantes telles que l’ENS Ulm, l’ESPCI, l’UPMC.</a:t>
             </a:r>
           </a:p>
           <a:p>
@@ -18549,13 +18415,13 @@
   <p:clrMapOvr>
     <a:masterClrMapping/>
   </p:clrMapOvr>
-  <p:transition>
+  <p:transition xmlns:p14="http://schemas.microsoft.com/office/powerpoint/2010/main">
     <p:fade/>
   </p:transition>
   <p:timing>
     <p:tnLst>
       <p:par>
-        <p:cTn id="1" dur="indefinite" restart="never" nodeType="tmRoot"/>
+        <p:cTn xmlns:p14="http://schemas.microsoft.com/office/powerpoint/2010/main" id="1" dur="indefinite" restart="never" nodeType="tmRoot"/>
       </p:par>
     </p:tnLst>
   </p:timing>
@@ -18605,20 +18471,20 @@
     </p:spTree>
     <p:extLst>
       <p:ext uri="{BB962C8B-B14F-4D97-AF65-F5344CB8AC3E}">
-        <p14:creationId xmlns="" xmlns:p14="http://schemas.microsoft.com/office/powerpoint/2010/main" val="956564192"/>
+        <p14:creationId xmlns:p14="http://schemas.microsoft.com/office/powerpoint/2010/main" val="956564192"/>
       </p:ext>
     </p:extLst>
   </p:cSld>
   <p:clrMapOvr>
     <a:masterClrMapping/>
   </p:clrMapOvr>
-  <p:transition>
+  <p:transition xmlns:p14="http://schemas.microsoft.com/office/powerpoint/2010/main">
     <p:fade/>
   </p:transition>
   <p:timing>
     <p:tnLst>
       <p:par>
-        <p:cTn id="1" dur="indefinite" restart="never" nodeType="tmRoot"/>
+        <p:cTn xmlns:p14="http://schemas.microsoft.com/office/powerpoint/2010/main" id="1" dur="indefinite" restart="never" nodeType="tmRoot"/>
       </p:par>
     </p:tnLst>
   </p:timing>
@@ -18944,13 +18810,13 @@
   <p:clrMapOvr>
     <a:masterClrMapping/>
   </p:clrMapOvr>
-  <p:transition>
+  <p:transition xmlns:p14="http://schemas.microsoft.com/office/powerpoint/2010/main">
     <p:fade/>
   </p:transition>
   <p:timing>
     <p:tnLst>
       <p:par>
-        <p:cTn id="1" dur="indefinite" restart="never" nodeType="tmRoot"/>
+        <p:cTn xmlns:p14="http://schemas.microsoft.com/office/powerpoint/2010/main" id="1" dur="indefinite" restart="never" nodeType="tmRoot"/>
       </p:par>
     </p:tnLst>
   </p:timing>
@@ -19174,11 +19040,7 @@
             <a:pPr lvl="2"/>
             <a:r>
               <a:rPr lang="fr-FR" dirty="0" smtClean="0"/>
-              <a:t>Sélection </a:t>
-            </a:r>
-            <a:r>
-              <a:rPr lang="fr-FR" dirty="0" smtClean="0"/>
-              <a:t>nationale. Trois autres équipes venant d’Ulm, de l’ESPCI et de l’UPMC.</a:t>
+              <a:t>Sélection nationale. Trois autres équipes venant d’Ulm, de l’ESPCI et de l’UPMC.</a:t>
             </a:r>
           </a:p>
           <a:p>
@@ -19329,20 +19191,20 @@
     </p:spTree>
     <p:extLst>
       <p:ext uri="{BB962C8B-B14F-4D97-AF65-F5344CB8AC3E}">
-        <p14:creationId xmlns="" xmlns:p14="http://schemas.microsoft.com/office/powerpoint/2010/main" val="3177870844"/>
+        <p14:creationId xmlns:p14="http://schemas.microsoft.com/office/powerpoint/2010/main" val="3177870844"/>
       </p:ext>
     </p:extLst>
   </p:cSld>
   <p:clrMapOvr>
     <a:masterClrMapping/>
   </p:clrMapOvr>
-  <p:transition>
+  <p:transition xmlns:p14="http://schemas.microsoft.com/office/powerpoint/2010/main">
     <p:fade/>
   </p:transition>
   <p:timing>
     <p:tnLst>
       <p:par>
-        <p:cTn id="1" dur="indefinite" restart="never" nodeType="tmRoot"/>
+        <p:cTn xmlns:p14="http://schemas.microsoft.com/office/powerpoint/2010/main" id="1" dur="indefinite" restart="never" nodeType="tmRoot"/>
       </p:par>
     </p:tnLst>
   </p:timing>

</xml_diff>